<commit_message>
Fixed an error in the Sprocket presentation.
</commit_message>
<xml_diff>
--- a/doc/presentations/Sprocket.pptx
+++ b/doc/presentations/Sprocket.pptx
@@ -305,7 +305,7 @@
             <a:fld id="{1D8BD707-D9CF-40AE-B4C6-C98DA3205C09}" type="datetimeFigureOut">
               <a:rPr lang="en-US" smtClean="0"/>
               <a:pPr/>
-              <a:t>2013-04-02</a:t>
+              <a:t>2013-04-10</a:t>
             </a:fld>
             <a:endParaRPr lang="en-US"/>
           </a:p>
@@ -472,7 +472,7 @@
             <a:fld id="{1D8BD707-D9CF-40AE-B4C6-C98DA3205C09}" type="datetimeFigureOut">
               <a:rPr lang="en-US" smtClean="0"/>
               <a:pPr/>
-              <a:t>2013-04-02</a:t>
+              <a:t>2013-04-10</a:t>
             </a:fld>
             <a:endParaRPr lang="en-US"/>
           </a:p>
@@ -649,7 +649,7 @@
             <a:fld id="{1D8BD707-D9CF-40AE-B4C6-C98DA3205C09}" type="datetimeFigureOut">
               <a:rPr lang="en-US" smtClean="0"/>
               <a:pPr/>
-              <a:t>2013-04-02</a:t>
+              <a:t>2013-04-10</a:t>
             </a:fld>
             <a:endParaRPr lang="en-US"/>
           </a:p>
@@ -816,7 +816,7 @@
             <a:fld id="{1D8BD707-D9CF-40AE-B4C6-C98DA3205C09}" type="datetimeFigureOut">
               <a:rPr lang="en-US" smtClean="0"/>
               <a:pPr/>
-              <a:t>2013-04-02</a:t>
+              <a:t>2013-04-10</a:t>
             </a:fld>
             <a:endParaRPr lang="en-US"/>
           </a:p>
@@ -1059,7 +1059,7 @@
             <a:fld id="{1D8BD707-D9CF-40AE-B4C6-C98DA3205C09}" type="datetimeFigureOut">
               <a:rPr lang="en-US" smtClean="0"/>
               <a:pPr/>
-              <a:t>2013-04-02</a:t>
+              <a:t>2013-04-10</a:t>
             </a:fld>
             <a:endParaRPr lang="en-US"/>
           </a:p>
@@ -1344,7 +1344,7 @@
             <a:fld id="{1D8BD707-D9CF-40AE-B4C6-C98DA3205C09}" type="datetimeFigureOut">
               <a:rPr lang="en-US" smtClean="0"/>
               <a:pPr/>
-              <a:t>2013-04-02</a:t>
+              <a:t>2013-04-10</a:t>
             </a:fld>
             <a:endParaRPr lang="en-US"/>
           </a:p>
@@ -1763,7 +1763,7 @@
             <a:fld id="{1D8BD707-D9CF-40AE-B4C6-C98DA3205C09}" type="datetimeFigureOut">
               <a:rPr lang="en-US" smtClean="0"/>
               <a:pPr/>
-              <a:t>2013-04-02</a:t>
+              <a:t>2013-04-10</a:t>
             </a:fld>
             <a:endParaRPr lang="en-US"/>
           </a:p>
@@ -1878,7 +1878,7 @@
             <a:fld id="{1D8BD707-D9CF-40AE-B4C6-C98DA3205C09}" type="datetimeFigureOut">
               <a:rPr lang="en-US" smtClean="0"/>
               <a:pPr/>
-              <a:t>2013-04-02</a:t>
+              <a:t>2013-04-10</a:t>
             </a:fld>
             <a:endParaRPr lang="en-US"/>
           </a:p>
@@ -1970,7 +1970,7 @@
             <a:fld id="{1D8BD707-D9CF-40AE-B4C6-C98DA3205C09}" type="datetimeFigureOut">
               <a:rPr lang="en-US" smtClean="0"/>
               <a:pPr/>
-              <a:t>2013-04-02</a:t>
+              <a:t>2013-04-10</a:t>
             </a:fld>
             <a:endParaRPr lang="en-US"/>
           </a:p>
@@ -2244,7 +2244,7 @@
             <a:fld id="{1D8BD707-D9CF-40AE-B4C6-C98DA3205C09}" type="datetimeFigureOut">
               <a:rPr lang="en-US" smtClean="0"/>
               <a:pPr/>
-              <a:t>2013-04-02</a:t>
+              <a:t>2013-04-10</a:t>
             </a:fld>
             <a:endParaRPr lang="en-US"/>
           </a:p>
@@ -2494,7 +2494,7 @@
             <a:fld id="{1D8BD707-D9CF-40AE-B4C6-C98DA3205C09}" type="datetimeFigureOut">
               <a:rPr lang="en-US" smtClean="0"/>
               <a:pPr/>
-              <a:t>2013-04-02</a:t>
+              <a:t>2013-04-10</a:t>
             </a:fld>
             <a:endParaRPr lang="en-US"/>
           </a:p>
@@ -2704,7 +2704,7 @@
             <a:fld id="{1D8BD707-D9CF-40AE-B4C6-C98DA3205C09}" type="datetimeFigureOut">
               <a:rPr lang="en-US" smtClean="0"/>
               <a:pPr/>
-              <a:t>2013-04-02</a:t>
+              <a:t>2013-04-10</a:t>
             </a:fld>
             <a:endParaRPr lang="en-US"/>
           </a:p>
@@ -3141,7 +3141,6 @@
               <a:rPr lang="en-US" dirty="0" smtClean="0"/>
               <a:t>April 3, 2013</a:t>
             </a:r>
-            <a:endParaRPr lang="en-US" dirty="0" smtClean="0"/>
           </a:p>
         </p:txBody>
       </p:sp>
@@ -4737,7 +4736,6 @@
               <a:rPr lang="en-US" dirty="0" smtClean="0"/>
               <a:t>Stub</a:t>
             </a:r>
-            <a:endParaRPr lang="en-US" dirty="0" smtClean="0"/>
           </a:p>
         </p:txBody>
       </p:sp>
@@ -4827,7 +4825,6 @@
               <a:rPr lang="en-US" dirty="0" smtClean="0"/>
               <a:t>Skeleton</a:t>
             </a:r>
-            <a:endParaRPr lang="en-US" dirty="0" smtClean="0"/>
           </a:p>
         </p:txBody>
       </p:sp>
@@ -4881,7 +4878,7 @@
         </p:nvSpPr>
         <p:spPr>
           <a:xfrm>
-            <a:off x="7010400" y="1866900"/>
+            <a:off x="7010400" y="3810000"/>
             <a:ext cx="1371600" cy="990600"/>
           </a:xfrm>
           <a:prstGeom prst="rect">
@@ -5143,14 +5140,14 @@
         <p:nvCxnSpPr>
           <p:cNvPr id="22" name="Straight Arrow Connector 21"/>
           <p:cNvCxnSpPr>
-            <a:stCxn id="5" idx="3"/>
+            <a:stCxn id="6" idx="3"/>
             <a:endCxn id="7" idx="1"/>
           </p:cNvCxnSpPr>
           <p:nvPr/>
         </p:nvCxnSpPr>
         <p:spPr>
           <a:xfrm>
-            <a:off x="6019800" y="2362200"/>
+            <a:off x="6019800" y="4305300"/>
             <a:ext cx="990600" cy="0"/>
           </a:xfrm>
           <a:prstGeom prst="straightConnector1">
@@ -5336,11 +5333,7 @@
           <a:p>
             <a:r>
               <a:rPr lang="en-US" dirty="0" smtClean="0"/>
-              <a:t>Memory </a:t>
-            </a:r>
-            <a:r>
-              <a:rPr lang="en-US" dirty="0" smtClean="0"/>
-              <a:t>Requirements</a:t>
+              <a:t>Memory Requirements</a:t>
             </a:r>
             <a:endParaRPr lang="en-US" dirty="0"/>
           </a:p>
@@ -5918,11 +5911,7 @@
           <a:p>
             <a:r>
               <a:rPr lang="en-US" sz="2000" dirty="0" smtClean="0"/>
-              <a:t>Packet buffers currently </a:t>
-            </a:r>
-            <a:r>
-              <a:rPr lang="en-US" sz="2000" dirty="0" smtClean="0"/>
-              <a:t>46 bytes; certificates are sent in fragments</a:t>
+              <a:t>Packet buffers currently 46 bytes; certificates are sent in fragments</a:t>
             </a:r>
             <a:endParaRPr lang="en-US" sz="2000" dirty="0"/>
           </a:p>
@@ -5975,11 +5964,7 @@
           <a:p>
             <a:r>
               <a:rPr lang="en-US" dirty="0" smtClean="0"/>
-              <a:t>Processing </a:t>
-            </a:r>
-            <a:r>
-              <a:rPr lang="en-US" dirty="0" smtClean="0"/>
-              <a:t>Time</a:t>
+              <a:t>Processing Time</a:t>
             </a:r>
             <a:endParaRPr lang="en-US" dirty="0"/>
           </a:p>
@@ -6384,11 +6369,7 @@
             </a:r>
             <a:r>
               <a:rPr lang="en-US" sz="2800" dirty="0" smtClean="0"/>
-              <a:t> </a:t>
-            </a:r>
-            <a:r>
-              <a:rPr lang="en-US" sz="2800" dirty="0" smtClean="0"/>
-              <a:t>feasible</a:t>
+              <a:t> feasible</a:t>
             </a:r>
           </a:p>
           <a:p>
@@ -6424,7 +6405,6 @@
               <a:rPr lang="en-US" sz="2400" dirty="0" smtClean="0"/>
               <a:t>High initial latency; minimal runtime overhead.</a:t>
             </a:r>
-            <a:endParaRPr lang="en-US" sz="2400" dirty="0" smtClean="0"/>
           </a:p>
           <a:p>
             <a:pPr marL="285750" indent="-285750">
@@ -6445,7 +6425,6 @@
               <a:rPr lang="en-US" sz="2800" dirty="0" smtClean="0"/>
               <a:t>Memory overhead significant, but manageable</a:t>
             </a:r>
-            <a:endParaRPr lang="en-US" sz="2800" dirty="0" smtClean="0"/>
           </a:p>
         </p:txBody>
       </p:sp>
@@ -6530,15 +6509,7 @@
             </a:pPr>
             <a:r>
               <a:rPr lang="en-US" sz="2800" dirty="0" smtClean="0"/>
-              <a:t>Enhance</a:t>
-            </a:r>
-            <a:r>
-              <a:rPr lang="en-US" sz="2800" dirty="0" smtClean="0"/>
-              <a:t> </a:t>
-            </a:r>
-            <a:r>
-              <a:rPr lang="en-US" sz="2800" dirty="0" smtClean="0"/>
-              <a:t>implementation</a:t>
+              <a:t>Enhance implementation</a:t>
             </a:r>
           </a:p>
           <a:p>

</xml_diff>

<commit_message>
Added a presentation on the Sprocket implementation.
</commit_message>
<xml_diff>
--- a/doc/presentations/Sprocket.pptx
+++ b/doc/presentations/Sprocket.pptx
@@ -305,7 +305,7 @@
             <a:fld id="{1D8BD707-D9CF-40AE-B4C6-C98DA3205C09}" type="datetimeFigureOut">
               <a:rPr lang="en-US" smtClean="0"/>
               <a:pPr/>
-              <a:t>2013-04-10</a:t>
+              <a:t>2013-06-17</a:t>
             </a:fld>
             <a:endParaRPr lang="en-US"/>
           </a:p>
@@ -472,7 +472,7 @@
             <a:fld id="{1D8BD707-D9CF-40AE-B4C6-C98DA3205C09}" type="datetimeFigureOut">
               <a:rPr lang="en-US" smtClean="0"/>
               <a:pPr/>
-              <a:t>2013-04-10</a:t>
+              <a:t>2013-06-17</a:t>
             </a:fld>
             <a:endParaRPr lang="en-US"/>
           </a:p>
@@ -649,7 +649,7 @@
             <a:fld id="{1D8BD707-D9CF-40AE-B4C6-C98DA3205C09}" type="datetimeFigureOut">
               <a:rPr lang="en-US" smtClean="0"/>
               <a:pPr/>
-              <a:t>2013-04-10</a:t>
+              <a:t>2013-06-17</a:t>
             </a:fld>
             <a:endParaRPr lang="en-US"/>
           </a:p>
@@ -816,7 +816,7 @@
             <a:fld id="{1D8BD707-D9CF-40AE-B4C6-C98DA3205C09}" type="datetimeFigureOut">
               <a:rPr lang="en-US" smtClean="0"/>
               <a:pPr/>
-              <a:t>2013-04-10</a:t>
+              <a:t>2013-06-17</a:t>
             </a:fld>
             <a:endParaRPr lang="en-US"/>
           </a:p>
@@ -1059,7 +1059,7 @@
             <a:fld id="{1D8BD707-D9CF-40AE-B4C6-C98DA3205C09}" type="datetimeFigureOut">
               <a:rPr lang="en-US" smtClean="0"/>
               <a:pPr/>
-              <a:t>2013-04-10</a:t>
+              <a:t>2013-06-17</a:t>
             </a:fld>
             <a:endParaRPr lang="en-US"/>
           </a:p>
@@ -1344,7 +1344,7 @@
             <a:fld id="{1D8BD707-D9CF-40AE-B4C6-C98DA3205C09}" type="datetimeFigureOut">
               <a:rPr lang="en-US" smtClean="0"/>
               <a:pPr/>
-              <a:t>2013-04-10</a:t>
+              <a:t>2013-06-17</a:t>
             </a:fld>
             <a:endParaRPr lang="en-US"/>
           </a:p>
@@ -1763,7 +1763,7 @@
             <a:fld id="{1D8BD707-D9CF-40AE-B4C6-C98DA3205C09}" type="datetimeFigureOut">
               <a:rPr lang="en-US" smtClean="0"/>
               <a:pPr/>
-              <a:t>2013-04-10</a:t>
+              <a:t>2013-06-17</a:t>
             </a:fld>
             <a:endParaRPr lang="en-US"/>
           </a:p>
@@ -1878,7 +1878,7 @@
             <a:fld id="{1D8BD707-D9CF-40AE-B4C6-C98DA3205C09}" type="datetimeFigureOut">
               <a:rPr lang="en-US" smtClean="0"/>
               <a:pPr/>
-              <a:t>2013-04-10</a:t>
+              <a:t>2013-06-17</a:t>
             </a:fld>
             <a:endParaRPr lang="en-US"/>
           </a:p>
@@ -1970,7 +1970,7 @@
             <a:fld id="{1D8BD707-D9CF-40AE-B4C6-C98DA3205C09}" type="datetimeFigureOut">
               <a:rPr lang="en-US" smtClean="0"/>
               <a:pPr/>
-              <a:t>2013-04-10</a:t>
+              <a:t>2013-06-17</a:t>
             </a:fld>
             <a:endParaRPr lang="en-US"/>
           </a:p>
@@ -2244,7 +2244,7 @@
             <a:fld id="{1D8BD707-D9CF-40AE-B4C6-C98DA3205C09}" type="datetimeFigureOut">
               <a:rPr lang="en-US" smtClean="0"/>
               <a:pPr/>
-              <a:t>2013-04-10</a:t>
+              <a:t>2013-06-17</a:t>
             </a:fld>
             <a:endParaRPr lang="en-US"/>
           </a:p>
@@ -2494,7 +2494,7 @@
             <a:fld id="{1D8BD707-D9CF-40AE-B4C6-C98DA3205C09}" type="datetimeFigureOut">
               <a:rPr lang="en-US" smtClean="0"/>
               <a:pPr/>
-              <a:t>2013-04-10</a:t>
+              <a:t>2013-06-17</a:t>
             </a:fld>
             <a:endParaRPr lang="en-US"/>
           </a:p>
@@ -2704,7 +2704,7 @@
             <a:fld id="{1D8BD707-D9CF-40AE-B4C6-C98DA3205C09}" type="datetimeFigureOut">
               <a:rPr lang="en-US" smtClean="0"/>
               <a:pPr/>
-              <a:t>2013-04-10</a:t>
+              <a:t>2013-06-17</a:t>
             </a:fld>
             <a:endParaRPr lang="en-US"/>
           </a:p>
@@ -3842,8 +3842,8 @@
         </p:nvSpPr>
         <p:spPr>
           <a:xfrm>
-            <a:off x="1981200" y="2057399"/>
-            <a:ext cx="5423280" cy="2031325"/>
+            <a:off x="1828800" y="2057398"/>
+            <a:ext cx="5698996" cy="2031325"/>
           </a:xfrm>
           <a:prstGeom prst="rect">
             <a:avLst/>
@@ -3967,7 +3967,27 @@
                 <a:latin typeface="Courier New" pitchFamily="49" charset="0"/>
                 <a:cs typeface="Courier New" pitchFamily="49" charset="0"/>
               </a:rPr>
-              <a:t>enable “*” for</a:t>
+              <a:t>activate</a:t>
+            </a:r>
+            <a:r>
+              <a:rPr lang="en-US" dirty="0" smtClean="0">
+                <a:solidFill>
+                  <a:srgbClr val="FF0000"/>
+                </a:solidFill>
+                <a:latin typeface="Courier New" pitchFamily="49" charset="0"/>
+                <a:cs typeface="Courier New" pitchFamily="49" charset="0"/>
+              </a:rPr>
+              <a:t> </a:t>
+            </a:r>
+            <a:r>
+              <a:rPr lang="en-US" dirty="0" smtClean="0">
+                <a:solidFill>
+                  <a:srgbClr val="FF0000"/>
+                </a:solidFill>
+                <a:latin typeface="Courier New" pitchFamily="49" charset="0"/>
+                <a:cs typeface="Courier New" pitchFamily="49" charset="0"/>
+              </a:rPr>
+              <a:t>“*” for</a:t>
             </a:r>
             <a:r>
               <a:rPr lang="en-US" dirty="0" smtClean="0">

</xml_diff>